<commit_message>
docs(sample): Remove slide number from template
</commit_message>
<xml_diff>
--- a/sample/template.pptx
+++ b/sample/template.pptx
@@ -6441,41 +6441,6 @@
               <a:rPr lang="en-US" dirty="0"/>
               <a:t>Logo Slide Maker Sample</a:t>
             </a:r>
-          </a:p>
-        </p:txBody>
-      </p:sp>
-      <p:sp>
-        <p:nvSpPr>
-          <p:cNvPr id="3" name="Slide Number Placeholder 2">
-            <a:extLst>
-              <a:ext uri="{FF2B5EF4-FFF2-40B4-BE49-F238E27FC236}">
-                <a16:creationId xmlns:a16="http://schemas.microsoft.com/office/drawing/2014/main" id="{2244084A-0289-782C-C2AC-07E397FB0C46}"/>
-              </a:ext>
-            </a:extLst>
-          </p:cNvPr>
-          <p:cNvSpPr>
-            <a:spLocks noGrp="1"/>
-          </p:cNvSpPr>
-          <p:nvPr>
-            <p:ph type="sldNum" sz="quarter" idx="4"/>
-          </p:nvPr>
-        </p:nvSpPr>
-        <p:spPr>
-          <a:xfrm>
-            <a:off x="8534400" y="6121252"/>
-            <a:ext cx="2743200" cy="365125"/>
-          </a:xfrm>
-        </p:spPr>
-        <p:txBody>
-          <a:bodyPr/>
-          <a:lstStyle/>
-          <a:p>
-            <a:fld id="{B5CEABB6-07DC-46E8-9B57-56EC44A396E5}" type="slidenum">
-              <a:rPr lang="en-US" smtClean="0"/>
-              <a:pPr/>
-              <a:t>1</a:t>
-            </a:fld>
-            <a:endParaRPr lang="en-US" dirty="0"/>
           </a:p>
         </p:txBody>
       </p:sp>
@@ -7416,23 +7381,12 @@
 </file>
 
 <file path=customXml/item1.xml><?xml version="1.0" encoding="utf-8"?>
-<p:properties xmlns:p="http://schemas.microsoft.com/office/2006/metadata/properties" xmlns:xsi="http://www.w3.org/2001/XMLSchema-instance" xmlns:pc="http://schemas.microsoft.com/office/infopath/2007/PartnerControls">
-  <documentManagement>
-    <_ip_UnifiedCompliancePolicyUIAction xmlns="http://schemas.microsoft.com/sharepoint/v3" xsi:nil="true"/>
-    <Image xmlns="71af3243-3dd4-4a8d-8c0d-dd76da1f02a5">
-      <Url xsi:nil="true"/>
-      <Description xsi:nil="true"/>
-    </Image>
-    <Status xmlns="71af3243-3dd4-4a8d-8c0d-dd76da1f02a5">Not started</Status>
-    <Background xmlns="71af3243-3dd4-4a8d-8c0d-dd76da1f02a5">false</Background>
-    <_ip_UnifiedCompliancePolicyProperties xmlns="http://schemas.microsoft.com/sharepoint/v3" xsi:nil="true"/>
-    <ImageTagsTaxHTField xmlns="71af3243-3dd4-4a8d-8c0d-dd76da1f02a5">
-      <Terms xmlns="http://schemas.microsoft.com/office/infopath/2007/PartnerControls"/>
-    </ImageTagsTaxHTField>
-    <TaxCatchAll xmlns="230e9df3-be65-4c73-a93b-d1236ebd677e" xsi:nil="true"/>
-    <MediaServiceKeyPoints xmlns="71af3243-3dd4-4a8d-8c0d-dd76da1f02a5" xsi:nil="true"/>
-  </documentManagement>
-</p:properties>
+<?mso-contentType ?>
+<FormTemplates xmlns="http://schemas.microsoft.com/sharepoint/v3/contenttype/forms">
+  <Display>DocumentLibraryForm</Display>
+  <Edit>DocumentLibraryForm</Edit>
+  <New>DocumentLibraryForm</New>
+</FormTemplates>
 </file>
 
 <file path=customXml/item2.xml><?xml version="1.0" encoding="utf-8"?>
@@ -7748,29 +7702,29 @@
 </file>
 
 <file path=customXml/item3.xml><?xml version="1.0" encoding="utf-8"?>
-<?mso-contentType ?>
-<FormTemplates xmlns="http://schemas.microsoft.com/sharepoint/v3/contenttype/forms">
-  <Display>DocumentLibraryForm</Display>
-  <Edit>DocumentLibraryForm</Edit>
-  <New>DocumentLibraryForm</New>
-</FormTemplates>
+<p:properties xmlns:p="http://schemas.microsoft.com/office/2006/metadata/properties" xmlns:xsi="http://www.w3.org/2001/XMLSchema-instance" xmlns:pc="http://schemas.microsoft.com/office/infopath/2007/PartnerControls">
+  <documentManagement>
+    <_ip_UnifiedCompliancePolicyUIAction xmlns="http://schemas.microsoft.com/sharepoint/v3" xsi:nil="true"/>
+    <Image xmlns="71af3243-3dd4-4a8d-8c0d-dd76da1f02a5">
+      <Url xsi:nil="true"/>
+      <Description xsi:nil="true"/>
+    </Image>
+    <Status xmlns="71af3243-3dd4-4a8d-8c0d-dd76da1f02a5">Not started</Status>
+    <Background xmlns="71af3243-3dd4-4a8d-8c0d-dd76da1f02a5">false</Background>
+    <_ip_UnifiedCompliancePolicyProperties xmlns="http://schemas.microsoft.com/sharepoint/v3" xsi:nil="true"/>
+    <ImageTagsTaxHTField xmlns="71af3243-3dd4-4a8d-8c0d-dd76da1f02a5">
+      <Terms xmlns="http://schemas.microsoft.com/office/infopath/2007/PartnerControls"/>
+    </ImageTagsTaxHTField>
+    <TaxCatchAll xmlns="230e9df3-be65-4c73-a93b-d1236ebd677e" xsi:nil="true"/>
+    <MediaServiceKeyPoints xmlns="71af3243-3dd4-4a8d-8c0d-dd76da1f02a5" xsi:nil="true"/>
+  </documentManagement>
+</p:properties>
 </file>
 
 <file path=customXml/itemProps1.xml><?xml version="1.0" encoding="utf-8"?>
-<ds:datastoreItem xmlns:ds="http://schemas.openxmlformats.org/officeDocument/2006/customXml" ds:itemID="{337CDA33-9251-49D0-A51A-7888AA3E0635}">
+<ds:datastoreItem xmlns:ds="http://schemas.openxmlformats.org/officeDocument/2006/customXml" ds:itemID="{3F796806-D3A7-49C6-9335-B8A0B9307F8E}">
   <ds:schemaRefs>
-    <ds:schemaRef ds:uri="230e9df3-be65-4c73-a93b-d1236ebd677e"/>
-    <ds:schemaRef ds:uri="16c05727-aa75-4e4a-9b5f-8a80a1165891"/>
-    <ds:schemaRef ds:uri="http://purl.org/dc/dcmitype/"/>
-    <ds:schemaRef ds:uri="http://schemas.microsoft.com/office/2006/metadata/properties"/>
-    <ds:schemaRef ds:uri="71af3243-3dd4-4a8d-8c0d-dd76da1f02a5"/>
-    <ds:schemaRef ds:uri="http://schemas.microsoft.com/office/infopath/2007/PartnerControls"/>
-    <ds:schemaRef ds:uri="http://schemas.microsoft.com/sharepoint/v3"/>
-    <ds:schemaRef ds:uri="http://purl.org/dc/elements/1.1/"/>
-    <ds:schemaRef ds:uri="http://schemas.microsoft.com/office/2006/documentManagement/types"/>
-    <ds:schemaRef ds:uri="http://schemas.openxmlformats.org/package/2006/metadata/core-properties"/>
-    <ds:schemaRef ds:uri="http://www.w3.org/XML/1998/namespace"/>
-    <ds:schemaRef ds:uri="http://purl.org/dc/terms/"/>
+    <ds:schemaRef ds:uri="http://schemas.microsoft.com/sharepoint/v3/contenttype/forms"/>
   </ds:schemaRefs>
 </ds:datastoreItem>
 </file>
@@ -7797,9 +7751,20 @@
 </file>
 
 <file path=customXml/itemProps3.xml><?xml version="1.0" encoding="utf-8"?>
-<ds:datastoreItem xmlns:ds="http://schemas.openxmlformats.org/officeDocument/2006/customXml" ds:itemID="{3F796806-D3A7-49C6-9335-B8A0B9307F8E}">
+<ds:datastoreItem xmlns:ds="http://schemas.openxmlformats.org/officeDocument/2006/customXml" ds:itemID="{337CDA33-9251-49D0-A51A-7888AA3E0635}">
   <ds:schemaRefs>
-    <ds:schemaRef ds:uri="http://schemas.microsoft.com/sharepoint/v3/contenttype/forms"/>
+    <ds:schemaRef ds:uri="230e9df3-be65-4c73-a93b-d1236ebd677e"/>
+    <ds:schemaRef ds:uri="16c05727-aa75-4e4a-9b5f-8a80a1165891"/>
+    <ds:schemaRef ds:uri="http://purl.org/dc/dcmitype/"/>
+    <ds:schemaRef ds:uri="http://schemas.microsoft.com/office/2006/metadata/properties"/>
+    <ds:schemaRef ds:uri="71af3243-3dd4-4a8d-8c0d-dd76da1f02a5"/>
+    <ds:schemaRef ds:uri="http://schemas.microsoft.com/office/infopath/2007/PartnerControls"/>
+    <ds:schemaRef ds:uri="http://schemas.microsoft.com/sharepoint/v3"/>
+    <ds:schemaRef ds:uri="http://purl.org/dc/elements/1.1/"/>
+    <ds:schemaRef ds:uri="http://schemas.microsoft.com/office/2006/documentManagement/types"/>
+    <ds:schemaRef ds:uri="http://schemas.openxmlformats.org/package/2006/metadata/core-properties"/>
+    <ds:schemaRef ds:uri="http://www.w3.org/XML/1998/namespace"/>
+    <ds:schemaRef ds:uri="http://purl.org/dc/terms/"/>
   </ds:schemaRefs>
 </ds:datastoreItem>
 </file>

</xml_diff>

<commit_message>
docs: Update embedded samples to use improved slide image
</commit_message>
<xml_diff>
--- a/sample/template.pptx
+++ b/sample/template.pptx
@@ -5,13 +5,14 @@
     <p:sldMasterId id="2147483648" r:id="rId4"/>
   </p:sldMasterIdLst>
   <p:notesMasterIdLst>
-    <p:notesMasterId r:id="rId6"/>
+    <p:notesMasterId r:id="rId7"/>
   </p:notesMasterIdLst>
   <p:handoutMasterIdLst>
-    <p:handoutMasterId r:id="rId7"/>
+    <p:handoutMasterId r:id="rId8"/>
   </p:handoutMasterIdLst>
   <p:sldIdLst>
     <p:sldId id="353" r:id="rId5"/>
+    <p:sldId id="354" r:id="rId6"/>
   </p:sldIdLst>
   <p:sldSz cx="12192000" cy="6858000"/>
   <p:notesSz cx="6858000" cy="9144000"/>
@@ -243,7 +244,7 @@
           <a:p>
             <a:fld id="{52818EB1-FF96-47AA-9A30-F1BFF2FFD1F7}" type="datetimeFigureOut">
               <a:rPr lang="en-US" smtClean="0"/>
-              <a:t>7/2/2024</a:t>
+              <a:t>7/6/2024</a:t>
             </a:fld>
             <a:endParaRPr lang="en-US" dirty="0"/>
           </a:p>
@@ -420,7 +421,7 @@
           <a:p>
             <a:fld id="{97E4A361-7934-4769-9B16-8A939698742C}" type="datetimeFigureOut">
               <a:rPr lang="en-US" smtClean="0"/>
-              <a:t>7/2/2024</a:t>
+              <a:t>7/6/2024</a:t>
             </a:fld>
             <a:endParaRPr lang="en-US" dirty="0"/>
           </a:p>
@@ -762,6 +763,90 @@
     <p:extLst>
       <p:ext uri="{BB962C8B-B14F-4D97-AF65-F5344CB8AC3E}">
         <p14:creationId xmlns:p14="http://schemas.microsoft.com/office/powerpoint/2010/main" val="2031756880"/>
+      </p:ext>
+    </p:extLst>
+  </p:cSld>
+  <p:clrMapOvr>
+    <a:masterClrMapping/>
+  </p:clrMapOvr>
+</p:notes>
+</file>
+
+<file path=ppt/notesSlides/notesSlide2.xml><?xml version="1.0" encoding="utf-8"?>
+<p:notes xmlns:a="http://schemas.openxmlformats.org/drawingml/2006/main" xmlns:r="http://schemas.openxmlformats.org/officeDocument/2006/relationships" xmlns:p="http://schemas.openxmlformats.org/presentationml/2006/main">
+  <p:cSld>
+    <p:spTree>
+      <p:nvGrpSpPr>
+        <p:cNvPr id="1" name=""/>
+        <p:cNvGrpSpPr/>
+        <p:nvPr/>
+      </p:nvGrpSpPr>
+      <p:grpSpPr>
+        <a:xfrm>
+          <a:off x="0" y="0"/>
+          <a:ext cx="0" cy="0"/>
+          <a:chOff x="0" y="0"/>
+          <a:chExt cx="0" cy="0"/>
+        </a:xfrm>
+      </p:grpSpPr>
+      <p:sp>
+        <p:nvSpPr>
+          <p:cNvPr id="2" name="Slide Image Placeholder 1"/>
+          <p:cNvSpPr>
+            <a:spLocks noGrp="1" noRot="1" noChangeAspect="1"/>
+          </p:cNvSpPr>
+          <p:nvPr>
+            <p:ph type="sldImg"/>
+          </p:nvPr>
+        </p:nvSpPr>
+        <p:spPr/>
+      </p:sp>
+      <p:sp>
+        <p:nvSpPr>
+          <p:cNvPr id="3" name="Notes Placeholder 2"/>
+          <p:cNvSpPr>
+            <a:spLocks noGrp="1"/>
+          </p:cNvSpPr>
+          <p:nvPr>
+            <p:ph type="body" idx="1"/>
+          </p:nvPr>
+        </p:nvSpPr>
+        <p:spPr/>
+        <p:txBody>
+          <a:bodyPr/>
+          <a:lstStyle/>
+          <a:p>
+            <a:endParaRPr lang="en-US" dirty="0"/>
+          </a:p>
+        </p:txBody>
+      </p:sp>
+      <p:sp>
+        <p:nvSpPr>
+          <p:cNvPr id="4" name="Slide Number Placeholder 3"/>
+          <p:cNvSpPr>
+            <a:spLocks noGrp="1"/>
+          </p:cNvSpPr>
+          <p:nvPr>
+            <p:ph type="sldNum" sz="quarter" idx="5"/>
+          </p:nvPr>
+        </p:nvSpPr>
+        <p:spPr/>
+        <p:txBody>
+          <a:bodyPr/>
+          <a:lstStyle/>
+          <a:p>
+            <a:fld id="{8D18E0B9-48E4-499D-93B2-B07D00395BAC}" type="slidenum">
+              <a:rPr lang="en-US" smtClean="0"/>
+              <a:t>2</a:t>
+            </a:fld>
+            <a:endParaRPr lang="en-US" dirty="0"/>
+          </a:p>
+        </p:txBody>
+      </p:sp>
+    </p:spTree>
+    <p:extLst>
+      <p:ext uri="{BB962C8B-B14F-4D97-AF65-F5344CB8AC3E}">
+        <p14:creationId xmlns:p14="http://schemas.microsoft.com/office/powerpoint/2010/main" val="870844591"/>
       </p:ext>
     </p:extLst>
   </p:cSld>
@@ -6595,6 +6680,260 @@
     <p:extLst>
       <p:ext uri="{BB962C8B-B14F-4D97-AF65-F5344CB8AC3E}">
         <p14:creationId xmlns:p14="http://schemas.microsoft.com/office/powerpoint/2010/main" val="2595549996"/>
+      </p:ext>
+    </p:extLst>
+  </p:cSld>
+  <p:clrMapOvr>
+    <a:masterClrMapping/>
+  </p:clrMapOvr>
+</p:sld>
+</file>
+
+<file path=ppt/slides/slide2.xml><?xml version="1.0" encoding="utf-8"?>
+<p:sld xmlns:a="http://schemas.openxmlformats.org/drawingml/2006/main" xmlns:r="http://schemas.openxmlformats.org/officeDocument/2006/relationships" xmlns:p="http://schemas.openxmlformats.org/presentationml/2006/main">
+  <p:cSld>
+    <p:spTree>
+      <p:nvGrpSpPr>
+        <p:cNvPr id="1" name=""/>
+        <p:cNvGrpSpPr/>
+        <p:nvPr/>
+      </p:nvGrpSpPr>
+      <p:grpSpPr>
+        <a:xfrm>
+          <a:off x="0" y="0"/>
+          <a:ext cx="0" cy="0"/>
+          <a:chOff x="0" y="0"/>
+          <a:chExt cx="0" cy="0"/>
+        </a:xfrm>
+      </p:grpSpPr>
+      <p:sp>
+        <p:nvSpPr>
+          <p:cNvPr id="2" name="Rectangle 1">
+            <a:extLst>
+              <a:ext uri="{FF2B5EF4-FFF2-40B4-BE49-F238E27FC236}">
+                <a16:creationId xmlns:a16="http://schemas.microsoft.com/office/drawing/2014/main" id="{C172FFAC-62CF-145A-E897-1C7801225D64}"/>
+              </a:ext>
+            </a:extLst>
+          </p:cNvPr>
+          <p:cNvSpPr/>
+          <p:nvPr/>
+        </p:nvSpPr>
+        <p:spPr>
+          <a:xfrm>
+            <a:off x="914400" y="2293841"/>
+            <a:ext cx="4943621" cy="3649753"/>
+          </a:xfrm>
+          <a:prstGeom prst="rect">
+            <a:avLst/>
+          </a:prstGeom>
+          <a:ln>
+            <a:solidFill>
+              <a:schemeClr val="accent4"/>
+            </a:solidFill>
+          </a:ln>
+        </p:spPr>
+        <p:style>
+          <a:lnRef idx="2">
+            <a:schemeClr val="accent5"/>
+          </a:lnRef>
+          <a:fillRef idx="1">
+            <a:schemeClr val="lt1"/>
+          </a:fillRef>
+          <a:effectRef idx="0">
+            <a:schemeClr val="accent5"/>
+          </a:effectRef>
+          <a:fontRef idx="minor">
+            <a:schemeClr val="dk1"/>
+          </a:fontRef>
+        </p:style>
+        <p:txBody>
+          <a:bodyPr rtlCol="0" anchor="ctr"/>
+          <a:lstStyle/>
+          <a:p>
+            <a:pPr algn="ctr"/>
+            <a:endParaRPr lang="en-US"/>
+          </a:p>
+        </p:txBody>
+      </p:sp>
+      <p:sp>
+        <p:nvSpPr>
+          <p:cNvPr id="4" name="Title 3">
+            <a:extLst>
+              <a:ext uri="{FF2B5EF4-FFF2-40B4-BE49-F238E27FC236}">
+                <a16:creationId xmlns:a16="http://schemas.microsoft.com/office/drawing/2014/main" id="{09E21A35-90B9-F235-7F48-11B56D97F6A4}"/>
+              </a:ext>
+            </a:extLst>
+          </p:cNvPr>
+          <p:cNvSpPr>
+            <a:spLocks noGrp="1"/>
+          </p:cNvSpPr>
+          <p:nvPr>
+            <p:ph type="title"/>
+          </p:nvPr>
+        </p:nvSpPr>
+        <p:spPr>
+          <a:xfrm>
+            <a:off x="929639" y="598947"/>
+            <a:ext cx="10347961" cy="1325563"/>
+          </a:xfrm>
+        </p:spPr>
+        <p:txBody>
+          <a:bodyPr/>
+          <a:lstStyle/>
+          <a:p>
+            <a:r>
+              <a:rPr lang="en-US" dirty="0"/>
+              <a:t>Logo Slide Maker Sample</a:t>
+            </a:r>
+          </a:p>
+        </p:txBody>
+      </p:sp>
+      <p:sp>
+        <p:nvSpPr>
+          <p:cNvPr id="6" name="Rectangle 5">
+            <a:extLst>
+              <a:ext uri="{FF2B5EF4-FFF2-40B4-BE49-F238E27FC236}">
+                <a16:creationId xmlns:a16="http://schemas.microsoft.com/office/drawing/2014/main" id="{390DD058-FE5E-B189-090C-A892D3E49201}"/>
+              </a:ext>
+            </a:extLst>
+          </p:cNvPr>
+          <p:cNvSpPr/>
+          <p:nvPr/>
+        </p:nvSpPr>
+        <p:spPr>
+          <a:xfrm>
+            <a:off x="6333979" y="2293841"/>
+            <a:ext cx="4943621" cy="3649753"/>
+          </a:xfrm>
+          <a:prstGeom prst="rect">
+            <a:avLst/>
+          </a:prstGeom>
+          <a:ln>
+            <a:solidFill>
+              <a:schemeClr val="accent4"/>
+            </a:solidFill>
+          </a:ln>
+        </p:spPr>
+        <p:style>
+          <a:lnRef idx="2">
+            <a:schemeClr val="accent5"/>
+          </a:lnRef>
+          <a:fillRef idx="1">
+            <a:schemeClr val="lt1"/>
+          </a:fillRef>
+          <a:effectRef idx="0">
+            <a:schemeClr val="accent5"/>
+          </a:effectRef>
+          <a:fontRef idx="minor">
+            <a:schemeClr val="dk1"/>
+          </a:fontRef>
+        </p:style>
+        <p:txBody>
+          <a:bodyPr rtlCol="0" anchor="ctr"/>
+          <a:lstStyle/>
+          <a:p>
+            <a:pPr algn="ctr"/>
+            <a:endParaRPr lang="en-US"/>
+          </a:p>
+        </p:txBody>
+      </p:sp>
+      <p:sp>
+        <p:nvSpPr>
+          <p:cNvPr id="11" name="TextBox 10">
+            <a:extLst>
+              <a:ext uri="{FF2B5EF4-FFF2-40B4-BE49-F238E27FC236}">
+                <a16:creationId xmlns:a16="http://schemas.microsoft.com/office/drawing/2014/main" id="{B8D2D5FF-FD4F-0794-7F1B-7A809755AB9A}"/>
+              </a:ext>
+            </a:extLst>
+          </p:cNvPr>
+          <p:cNvSpPr txBox="1"/>
+          <p:nvPr/>
+        </p:nvSpPr>
+        <p:spPr>
+          <a:xfrm>
+            <a:off x="914400" y="1924510"/>
+            <a:ext cx="2904978" cy="369332"/>
+          </a:xfrm>
+          <a:prstGeom prst="rect">
+            <a:avLst/>
+          </a:prstGeom>
+          <a:solidFill>
+            <a:schemeClr val="accent4"/>
+          </a:solidFill>
+          <a:ln w="12700">
+            <a:solidFill>
+              <a:schemeClr val="accent4"/>
+            </a:solidFill>
+          </a:ln>
+        </p:spPr>
+        <p:txBody>
+          <a:bodyPr wrap="square" lIns="164592" rIns="164592" rtlCol="0" anchor="ctr">
+            <a:spAutoFit/>
+          </a:bodyPr>
+          <a:lstStyle/>
+          <a:p>
+            <a:r>
+              <a:rPr lang="en-US" dirty="0">
+                <a:solidFill>
+                  <a:schemeClr val="bg1"/>
+                </a:solidFill>
+              </a:rPr>
+              <a:t>Left Side</a:t>
+            </a:r>
+          </a:p>
+        </p:txBody>
+      </p:sp>
+      <p:sp>
+        <p:nvSpPr>
+          <p:cNvPr id="12" name="TextBox 11">
+            <a:extLst>
+              <a:ext uri="{FF2B5EF4-FFF2-40B4-BE49-F238E27FC236}">
+                <a16:creationId xmlns:a16="http://schemas.microsoft.com/office/drawing/2014/main" id="{02826F70-3DAF-A65D-90A2-5E13186C8F7C}"/>
+              </a:ext>
+            </a:extLst>
+          </p:cNvPr>
+          <p:cNvSpPr txBox="1"/>
+          <p:nvPr/>
+        </p:nvSpPr>
+        <p:spPr>
+          <a:xfrm>
+            <a:off x="8387862" y="1924510"/>
+            <a:ext cx="2889738" cy="369332"/>
+          </a:xfrm>
+          <a:prstGeom prst="rect">
+            <a:avLst/>
+          </a:prstGeom>
+          <a:solidFill>
+            <a:schemeClr val="accent4"/>
+          </a:solidFill>
+          <a:ln w="12700">
+            <a:solidFill>
+              <a:schemeClr val="accent4"/>
+            </a:solidFill>
+          </a:ln>
+        </p:spPr>
+        <p:txBody>
+          <a:bodyPr wrap="square" lIns="164592" rIns="164592" rtlCol="0" anchor="ctr">
+            <a:spAutoFit/>
+          </a:bodyPr>
+          <a:lstStyle/>
+          <a:p>
+            <a:pPr algn="r"/>
+            <a:r>
+              <a:rPr lang="en-US" dirty="0">
+                <a:solidFill>
+                  <a:schemeClr val="bg1"/>
+                </a:solidFill>
+              </a:rPr>
+              <a:t>Right Side</a:t>
+            </a:r>
+          </a:p>
+        </p:txBody>
+      </p:sp>
+    </p:spTree>
+    <p:extLst>
+      <p:ext uri="{BB962C8B-B14F-4D97-AF65-F5344CB8AC3E}">
+        <p14:creationId xmlns:p14="http://schemas.microsoft.com/office/powerpoint/2010/main" val="3287726736"/>
       </p:ext>
     </p:extLst>
   </p:cSld>
@@ -7396,23 +7735,12 @@
 </file>
 
 <file path=customXml/item1.xml><?xml version="1.0" encoding="utf-8"?>
-<p:properties xmlns:p="http://schemas.microsoft.com/office/2006/metadata/properties" xmlns:xsi="http://www.w3.org/2001/XMLSchema-instance" xmlns:pc="http://schemas.microsoft.com/office/infopath/2007/PartnerControls">
-  <documentManagement>
-    <_ip_UnifiedCompliancePolicyUIAction xmlns="http://schemas.microsoft.com/sharepoint/v3" xsi:nil="true"/>
-    <Image xmlns="71af3243-3dd4-4a8d-8c0d-dd76da1f02a5">
-      <Url xsi:nil="true"/>
-      <Description xsi:nil="true"/>
-    </Image>
-    <Status xmlns="71af3243-3dd4-4a8d-8c0d-dd76da1f02a5">Not started</Status>
-    <Background xmlns="71af3243-3dd4-4a8d-8c0d-dd76da1f02a5">false</Background>
-    <_ip_UnifiedCompliancePolicyProperties xmlns="http://schemas.microsoft.com/sharepoint/v3" xsi:nil="true"/>
-    <ImageTagsTaxHTField xmlns="71af3243-3dd4-4a8d-8c0d-dd76da1f02a5">
-      <Terms xmlns="http://schemas.microsoft.com/office/infopath/2007/PartnerControls"/>
-    </ImageTagsTaxHTField>
-    <TaxCatchAll xmlns="230e9df3-be65-4c73-a93b-d1236ebd677e" xsi:nil="true"/>
-    <MediaServiceKeyPoints xmlns="71af3243-3dd4-4a8d-8c0d-dd76da1f02a5" xsi:nil="true"/>
-  </documentManagement>
-</p:properties>
+<?mso-contentType ?>
+<FormTemplates xmlns="http://schemas.microsoft.com/sharepoint/v3/contenttype/forms">
+  <Display>DocumentLibraryForm</Display>
+  <Edit>DocumentLibraryForm</Edit>
+  <New>DocumentLibraryForm</New>
+</FormTemplates>
 </file>
 
 <file path=customXml/item2.xml><?xml version="1.0" encoding="utf-8"?>
@@ -7728,29 +8056,29 @@
 </file>
 
 <file path=customXml/item3.xml><?xml version="1.0" encoding="utf-8"?>
-<?mso-contentType ?>
-<FormTemplates xmlns="http://schemas.microsoft.com/sharepoint/v3/contenttype/forms">
-  <Display>DocumentLibraryForm</Display>
-  <Edit>DocumentLibraryForm</Edit>
-  <New>DocumentLibraryForm</New>
-</FormTemplates>
+<p:properties xmlns:p="http://schemas.microsoft.com/office/2006/metadata/properties" xmlns:xsi="http://www.w3.org/2001/XMLSchema-instance" xmlns:pc="http://schemas.microsoft.com/office/infopath/2007/PartnerControls">
+  <documentManagement>
+    <_ip_UnifiedCompliancePolicyUIAction xmlns="http://schemas.microsoft.com/sharepoint/v3" xsi:nil="true"/>
+    <Image xmlns="71af3243-3dd4-4a8d-8c0d-dd76da1f02a5">
+      <Url xsi:nil="true"/>
+      <Description xsi:nil="true"/>
+    </Image>
+    <Status xmlns="71af3243-3dd4-4a8d-8c0d-dd76da1f02a5">Not started</Status>
+    <Background xmlns="71af3243-3dd4-4a8d-8c0d-dd76da1f02a5">false</Background>
+    <_ip_UnifiedCompliancePolicyProperties xmlns="http://schemas.microsoft.com/sharepoint/v3" xsi:nil="true"/>
+    <ImageTagsTaxHTField xmlns="71af3243-3dd4-4a8d-8c0d-dd76da1f02a5">
+      <Terms xmlns="http://schemas.microsoft.com/office/infopath/2007/PartnerControls"/>
+    </ImageTagsTaxHTField>
+    <TaxCatchAll xmlns="230e9df3-be65-4c73-a93b-d1236ebd677e" xsi:nil="true"/>
+    <MediaServiceKeyPoints xmlns="71af3243-3dd4-4a8d-8c0d-dd76da1f02a5" xsi:nil="true"/>
+  </documentManagement>
+</p:properties>
 </file>
 
 <file path=customXml/itemProps1.xml><?xml version="1.0" encoding="utf-8"?>
-<ds:datastoreItem xmlns:ds="http://schemas.openxmlformats.org/officeDocument/2006/customXml" ds:itemID="{337CDA33-9251-49D0-A51A-7888AA3E0635}">
+<ds:datastoreItem xmlns:ds="http://schemas.openxmlformats.org/officeDocument/2006/customXml" ds:itemID="{3F796806-D3A7-49C6-9335-B8A0B9307F8E}">
   <ds:schemaRefs>
-    <ds:schemaRef ds:uri="230e9df3-be65-4c73-a93b-d1236ebd677e"/>
-    <ds:schemaRef ds:uri="16c05727-aa75-4e4a-9b5f-8a80a1165891"/>
-    <ds:schemaRef ds:uri="http://purl.org/dc/dcmitype/"/>
-    <ds:schemaRef ds:uri="http://schemas.microsoft.com/office/2006/metadata/properties"/>
-    <ds:schemaRef ds:uri="71af3243-3dd4-4a8d-8c0d-dd76da1f02a5"/>
-    <ds:schemaRef ds:uri="http://schemas.microsoft.com/office/infopath/2007/PartnerControls"/>
-    <ds:schemaRef ds:uri="http://schemas.microsoft.com/sharepoint/v3"/>
-    <ds:schemaRef ds:uri="http://purl.org/dc/elements/1.1/"/>
-    <ds:schemaRef ds:uri="http://schemas.microsoft.com/office/2006/documentManagement/types"/>
-    <ds:schemaRef ds:uri="http://schemas.openxmlformats.org/package/2006/metadata/core-properties"/>
-    <ds:schemaRef ds:uri="http://www.w3.org/XML/1998/namespace"/>
-    <ds:schemaRef ds:uri="http://purl.org/dc/terms/"/>
+    <ds:schemaRef ds:uri="http://schemas.microsoft.com/sharepoint/v3/contenttype/forms"/>
   </ds:schemaRefs>
 </ds:datastoreItem>
 </file>
@@ -7777,9 +8105,20 @@
 </file>
 
 <file path=customXml/itemProps3.xml><?xml version="1.0" encoding="utf-8"?>
-<ds:datastoreItem xmlns:ds="http://schemas.openxmlformats.org/officeDocument/2006/customXml" ds:itemID="{3F796806-D3A7-49C6-9335-B8A0B9307F8E}">
+<ds:datastoreItem xmlns:ds="http://schemas.openxmlformats.org/officeDocument/2006/customXml" ds:itemID="{337CDA33-9251-49D0-A51A-7888AA3E0635}">
   <ds:schemaRefs>
-    <ds:schemaRef ds:uri="http://schemas.microsoft.com/sharepoint/v3/contenttype/forms"/>
+    <ds:schemaRef ds:uri="http://purl.org/dc/dcmitype/"/>
+    <ds:schemaRef ds:uri="http://purl.org/dc/elements/1.1/"/>
+    <ds:schemaRef ds:uri="http://www.w3.org/XML/1998/namespace"/>
+    <ds:schemaRef ds:uri="16c05727-aa75-4e4a-9b5f-8a80a1165891"/>
+    <ds:schemaRef ds:uri="http://schemas.microsoft.com/office/2006/documentManagement/types"/>
+    <ds:schemaRef ds:uri="http://schemas.microsoft.com/sharepoint/v3"/>
+    <ds:schemaRef ds:uri="http://schemas.microsoft.com/office/infopath/2007/PartnerControls"/>
+    <ds:schemaRef ds:uri="http://schemas.openxmlformats.org/package/2006/metadata/core-properties"/>
+    <ds:schemaRef ds:uri="230e9df3-be65-4c73-a93b-d1236ebd677e"/>
+    <ds:schemaRef ds:uri="71af3243-3dd4-4a8d-8c0d-dd76da1f02a5"/>
+    <ds:schemaRef ds:uri="http://schemas.microsoft.com/office/2006/metadata/properties"/>
+    <ds:schemaRef ds:uri="http://purl.org/dc/terms/"/>
   </ds:schemaRefs>
 </ds:datastoreItem>
 </file>

</xml_diff>

<commit_message>
refactor: Simplify layout, move complexity to rendering
</commit_message>
<xml_diff>
--- a/sample/template.pptx
+++ b/sample/template.pptx
@@ -244,7 +244,7 @@
           <a:p>
             <a:fld id="{52818EB1-FF96-47AA-9A30-F1BFF2FFD1F7}" type="datetimeFigureOut">
               <a:rPr lang="en-US" smtClean="0"/>
-              <a:t>7/6/2024</a:t>
+              <a:t>12/4/2024</a:t>
             </a:fld>
             <a:endParaRPr lang="en-US" dirty="0"/>
           </a:p>
@@ -421,7 +421,7 @@
           <a:p>
             <a:fld id="{97E4A361-7934-4769-9B16-8A939698742C}" type="datetimeFigureOut">
               <a:rPr lang="en-US" smtClean="0"/>
-              <a:t>7/6/2024</a:t>
+              <a:t>12/4/2024</a:t>
             </a:fld>
             <a:endParaRPr lang="en-US" dirty="0"/>
           </a:p>
@@ -6466,7 +6466,7 @@
         </p:nvSpPr>
         <p:spPr>
           <a:xfrm>
-            <a:off x="914400" y="2293841"/>
+            <a:off x="929639" y="2296427"/>
             <a:ext cx="4943621" cy="3649753"/>
           </a:xfrm>
           <a:prstGeom prst="rect">
@@ -6598,7 +6598,7 @@
         <p:spPr>
           <a:xfrm>
             <a:off x="914400" y="1924510"/>
-            <a:ext cx="2904978" cy="369332"/>
+            <a:ext cx="4958860" cy="369332"/>
           </a:xfrm>
           <a:prstGeom prst="rect">
             <a:avLst/>
@@ -6618,14 +6618,11 @@
           </a:bodyPr>
           <a:lstStyle/>
           <a:p>
-            <a:r>
-              <a:rPr lang="en-US" dirty="0">
-                <a:solidFill>
-                  <a:schemeClr val="bg1"/>
-                </a:solidFill>
-              </a:rPr>
-              <a:t>Cloud Native Projects</a:t>
-            </a:r>
+            <a:endParaRPr lang="en-US" dirty="0">
+              <a:solidFill>
+                <a:schemeClr val="bg1"/>
+              </a:solidFill>
+            </a:endParaRPr>
           </a:p>
         </p:txBody>
       </p:sp>
@@ -6643,8 +6640,8 @@
         </p:nvSpPr>
         <p:spPr>
           <a:xfrm>
-            <a:off x="8387862" y="1924510"/>
-            <a:ext cx="2889738" cy="369332"/>
+            <a:off x="6333978" y="1924510"/>
+            <a:ext cx="4943622" cy="369332"/>
           </a:xfrm>
           <a:prstGeom prst="rect">
             <a:avLst/>
@@ -6665,14 +6662,11 @@
           <a:lstStyle/>
           <a:p>
             <a:pPr algn="r"/>
-            <a:r>
-              <a:rPr lang="en-US" dirty="0">
-                <a:solidFill>
-                  <a:schemeClr val="bg1"/>
-                </a:solidFill>
-              </a:rPr>
-              <a:t>Windows OSS Apps</a:t>
-            </a:r>
+            <a:endParaRPr lang="en-US" dirty="0">
+              <a:solidFill>
+                <a:schemeClr val="bg1"/>
+              </a:solidFill>
+            </a:endParaRPr>
           </a:p>
         </p:txBody>
       </p:sp>
@@ -7735,12 +7729,23 @@
 </file>
 
 <file path=customXml/item1.xml><?xml version="1.0" encoding="utf-8"?>
-<?mso-contentType ?>
-<FormTemplates xmlns="http://schemas.microsoft.com/sharepoint/v3/contenttype/forms">
-  <Display>DocumentLibraryForm</Display>
-  <Edit>DocumentLibraryForm</Edit>
-  <New>DocumentLibraryForm</New>
-</FormTemplates>
+<p:properties xmlns:p="http://schemas.microsoft.com/office/2006/metadata/properties" xmlns:xsi="http://www.w3.org/2001/XMLSchema-instance" xmlns:pc="http://schemas.microsoft.com/office/infopath/2007/PartnerControls">
+  <documentManagement>
+    <_ip_UnifiedCompliancePolicyUIAction xmlns="http://schemas.microsoft.com/sharepoint/v3" xsi:nil="true"/>
+    <Image xmlns="71af3243-3dd4-4a8d-8c0d-dd76da1f02a5">
+      <Url xsi:nil="true"/>
+      <Description xsi:nil="true"/>
+    </Image>
+    <Status xmlns="71af3243-3dd4-4a8d-8c0d-dd76da1f02a5">Not started</Status>
+    <Background xmlns="71af3243-3dd4-4a8d-8c0d-dd76da1f02a5">false</Background>
+    <_ip_UnifiedCompliancePolicyProperties xmlns="http://schemas.microsoft.com/sharepoint/v3" xsi:nil="true"/>
+    <ImageTagsTaxHTField xmlns="71af3243-3dd4-4a8d-8c0d-dd76da1f02a5">
+      <Terms xmlns="http://schemas.microsoft.com/office/infopath/2007/PartnerControls"/>
+    </ImageTagsTaxHTField>
+    <TaxCatchAll xmlns="230e9df3-be65-4c73-a93b-d1236ebd677e" xsi:nil="true"/>
+    <MediaServiceKeyPoints xmlns="71af3243-3dd4-4a8d-8c0d-dd76da1f02a5" xsi:nil="true"/>
+  </documentManagement>
+</p:properties>
 </file>
 
 <file path=customXml/item2.xml><?xml version="1.0" encoding="utf-8"?>
@@ -8056,29 +8061,29 @@
 </file>
 
 <file path=customXml/item3.xml><?xml version="1.0" encoding="utf-8"?>
-<p:properties xmlns:p="http://schemas.microsoft.com/office/2006/metadata/properties" xmlns:xsi="http://www.w3.org/2001/XMLSchema-instance" xmlns:pc="http://schemas.microsoft.com/office/infopath/2007/PartnerControls">
-  <documentManagement>
-    <_ip_UnifiedCompliancePolicyUIAction xmlns="http://schemas.microsoft.com/sharepoint/v3" xsi:nil="true"/>
-    <Image xmlns="71af3243-3dd4-4a8d-8c0d-dd76da1f02a5">
-      <Url xsi:nil="true"/>
-      <Description xsi:nil="true"/>
-    </Image>
-    <Status xmlns="71af3243-3dd4-4a8d-8c0d-dd76da1f02a5">Not started</Status>
-    <Background xmlns="71af3243-3dd4-4a8d-8c0d-dd76da1f02a5">false</Background>
-    <_ip_UnifiedCompliancePolicyProperties xmlns="http://schemas.microsoft.com/sharepoint/v3" xsi:nil="true"/>
-    <ImageTagsTaxHTField xmlns="71af3243-3dd4-4a8d-8c0d-dd76da1f02a5">
-      <Terms xmlns="http://schemas.microsoft.com/office/infopath/2007/PartnerControls"/>
-    </ImageTagsTaxHTField>
-    <TaxCatchAll xmlns="230e9df3-be65-4c73-a93b-d1236ebd677e" xsi:nil="true"/>
-    <MediaServiceKeyPoints xmlns="71af3243-3dd4-4a8d-8c0d-dd76da1f02a5" xsi:nil="true"/>
-  </documentManagement>
-</p:properties>
+<?mso-contentType ?>
+<FormTemplates xmlns="http://schemas.microsoft.com/sharepoint/v3/contenttype/forms">
+  <Display>DocumentLibraryForm</Display>
+  <Edit>DocumentLibraryForm</Edit>
+  <New>DocumentLibraryForm</New>
+</FormTemplates>
 </file>
 
 <file path=customXml/itemProps1.xml><?xml version="1.0" encoding="utf-8"?>
-<ds:datastoreItem xmlns:ds="http://schemas.openxmlformats.org/officeDocument/2006/customXml" ds:itemID="{3F796806-D3A7-49C6-9335-B8A0B9307F8E}">
+<ds:datastoreItem xmlns:ds="http://schemas.openxmlformats.org/officeDocument/2006/customXml" ds:itemID="{337CDA33-9251-49D0-A51A-7888AA3E0635}">
   <ds:schemaRefs>
-    <ds:schemaRef ds:uri="http://schemas.microsoft.com/sharepoint/v3/contenttype/forms"/>
+    <ds:schemaRef ds:uri="http://purl.org/dc/dcmitype/"/>
+    <ds:schemaRef ds:uri="http://purl.org/dc/elements/1.1/"/>
+    <ds:schemaRef ds:uri="http://www.w3.org/XML/1998/namespace"/>
+    <ds:schemaRef ds:uri="16c05727-aa75-4e4a-9b5f-8a80a1165891"/>
+    <ds:schemaRef ds:uri="http://schemas.microsoft.com/office/2006/documentManagement/types"/>
+    <ds:schemaRef ds:uri="http://schemas.microsoft.com/sharepoint/v3"/>
+    <ds:schemaRef ds:uri="http://schemas.microsoft.com/office/infopath/2007/PartnerControls"/>
+    <ds:schemaRef ds:uri="http://schemas.openxmlformats.org/package/2006/metadata/core-properties"/>
+    <ds:schemaRef ds:uri="230e9df3-be65-4c73-a93b-d1236ebd677e"/>
+    <ds:schemaRef ds:uri="71af3243-3dd4-4a8d-8c0d-dd76da1f02a5"/>
+    <ds:schemaRef ds:uri="http://schemas.microsoft.com/office/2006/metadata/properties"/>
+    <ds:schemaRef ds:uri="http://purl.org/dc/terms/"/>
   </ds:schemaRefs>
 </ds:datastoreItem>
 </file>
@@ -8105,20 +8110,9 @@
 </file>
 
 <file path=customXml/itemProps3.xml><?xml version="1.0" encoding="utf-8"?>
-<ds:datastoreItem xmlns:ds="http://schemas.openxmlformats.org/officeDocument/2006/customXml" ds:itemID="{337CDA33-9251-49D0-A51A-7888AA3E0635}">
+<ds:datastoreItem xmlns:ds="http://schemas.openxmlformats.org/officeDocument/2006/customXml" ds:itemID="{3F796806-D3A7-49C6-9335-B8A0B9307F8E}">
   <ds:schemaRefs>
-    <ds:schemaRef ds:uri="http://purl.org/dc/dcmitype/"/>
-    <ds:schemaRef ds:uri="http://purl.org/dc/elements/1.1/"/>
-    <ds:schemaRef ds:uri="http://www.w3.org/XML/1998/namespace"/>
-    <ds:schemaRef ds:uri="16c05727-aa75-4e4a-9b5f-8a80a1165891"/>
-    <ds:schemaRef ds:uri="http://schemas.microsoft.com/office/2006/documentManagement/types"/>
-    <ds:schemaRef ds:uri="http://schemas.microsoft.com/sharepoint/v3"/>
-    <ds:schemaRef ds:uri="http://schemas.microsoft.com/office/infopath/2007/PartnerControls"/>
-    <ds:schemaRef ds:uri="http://schemas.openxmlformats.org/package/2006/metadata/core-properties"/>
-    <ds:schemaRef ds:uri="230e9df3-be65-4c73-a93b-d1236ebd677e"/>
-    <ds:schemaRef ds:uri="71af3243-3dd4-4a8d-8c0d-dd76da1f02a5"/>
-    <ds:schemaRef ds:uri="http://schemas.microsoft.com/office/2006/metadata/properties"/>
-    <ds:schemaRef ds:uri="http://purl.org/dc/terms/"/>
+    <ds:schemaRef ds:uri="http://schemas.microsoft.com/sharepoint/v3/contenttype/forms"/>
   </ds:schemaRefs>
 </ds:datastoreItem>
 </file>

</xml_diff>